<commit_message>
L08 Add bad code format sample to home tasks overview
</commit_message>
<xml_diff>
--- a/Lectures/Lesson 08 - Home Task Overview.pptx
+++ b/Lectures/Lesson 08 - Home Task Overview.pptx
@@ -5,7 +5,7 @@
     <p:sldMasterId id="2147483648" r:id="rId1"/>
   </p:sldMasterIdLst>
   <p:notesMasterIdLst>
-    <p:notesMasterId r:id="rId20"/>
+    <p:notesMasterId r:id="rId21"/>
   </p:notesMasterIdLst>
   <p:sldIdLst>
     <p:sldId id="256" r:id="rId2"/>
@@ -14,18 +14,19 @@
     <p:sldId id="259" r:id="rId5"/>
     <p:sldId id="260" r:id="rId6"/>
     <p:sldId id="261" r:id="rId7"/>
-    <p:sldId id="262" r:id="rId8"/>
-    <p:sldId id="263" r:id="rId9"/>
-    <p:sldId id="264" r:id="rId10"/>
-    <p:sldId id="265" r:id="rId11"/>
-    <p:sldId id="266" r:id="rId12"/>
-    <p:sldId id="267" r:id="rId13"/>
-    <p:sldId id="268" r:id="rId14"/>
-    <p:sldId id="269" r:id="rId15"/>
-    <p:sldId id="270" r:id="rId16"/>
-    <p:sldId id="271" r:id="rId17"/>
-    <p:sldId id="272" r:id="rId18"/>
-    <p:sldId id="273" r:id="rId19"/>
+    <p:sldId id="274" r:id="rId8"/>
+    <p:sldId id="262" r:id="rId9"/>
+    <p:sldId id="263" r:id="rId10"/>
+    <p:sldId id="264" r:id="rId11"/>
+    <p:sldId id="265" r:id="rId12"/>
+    <p:sldId id="266" r:id="rId13"/>
+    <p:sldId id="267" r:id="rId14"/>
+    <p:sldId id="268" r:id="rId15"/>
+    <p:sldId id="269" r:id="rId16"/>
+    <p:sldId id="270" r:id="rId17"/>
+    <p:sldId id="271" r:id="rId18"/>
+    <p:sldId id="272" r:id="rId19"/>
+    <p:sldId id="273" r:id="rId20"/>
   </p:sldIdLst>
   <p:sldSz cx="12192000" cy="6858000"/>
   <p:notesSz cx="6858000" cy="9144000"/>
@@ -214,7 +215,7 @@
           <a:p>
             <a:fld id="{B01E38BB-2846-4DFE-9033-E33FDE20CC8A}" type="datetimeFigureOut">
               <a:rPr lang="en-US" smtClean="0"/>
-              <a:t>08-Dec-18</a:t>
+              <a:t>12/9/2018</a:t>
             </a:fld>
             <a:endParaRPr lang="en-US"/>
           </a:p>
@@ -612,6 +613,98 @@
           <a:p>
             <a:r>
               <a:rPr lang="en-US" dirty="0" smtClean="0"/>
+              <a:t>Do not</a:t>
+            </a:r>
+            <a:r>
+              <a:rPr lang="en-US" baseline="0" dirty="0" smtClean="0"/>
+              <a:t> modify home task description</a:t>
+            </a:r>
+            <a:endParaRPr lang="en-US" dirty="0"/>
+          </a:p>
+        </p:txBody>
+      </p:sp>
+      <p:sp>
+        <p:nvSpPr>
+          <p:cNvPr id="4" name="Slide Number Placeholder 3"/>
+          <p:cNvSpPr>
+            <a:spLocks noGrp="1"/>
+          </p:cNvSpPr>
+          <p:nvPr>
+            <p:ph type="sldNum" sz="quarter" idx="10"/>
+          </p:nvPr>
+        </p:nvSpPr>
+        <p:spPr/>
+        <p:txBody>
+          <a:bodyPr/>
+          <a:lstStyle/>
+          <a:p>
+            <a:fld id="{9C14674E-9EC5-4AAF-8942-7F508780F6C1}" type="slidenum">
+              <a:rPr lang="en-US" smtClean="0"/>
+              <a:t>16</a:t>
+            </a:fld>
+            <a:endParaRPr lang="en-US"/>
+          </a:p>
+        </p:txBody>
+      </p:sp>
+    </p:spTree>
+    <p:extLst>
+      <p:ext uri="{BB962C8B-B14F-4D97-AF65-F5344CB8AC3E}">
+        <p14:creationId xmlns:p14="http://schemas.microsoft.com/office/powerpoint/2010/main" val="3011367316"/>
+      </p:ext>
+    </p:extLst>
+  </p:cSld>
+  <p:clrMapOvr>
+    <a:masterClrMapping/>
+  </p:clrMapOvr>
+</p:notes>
+</file>
+
+<file path=ppt/notesSlides/notesSlide11.xml><?xml version="1.0" encoding="utf-8"?>
+<p:notes xmlns:a="http://schemas.openxmlformats.org/drawingml/2006/main" xmlns:r="http://schemas.openxmlformats.org/officeDocument/2006/relationships" xmlns:p="http://schemas.openxmlformats.org/presentationml/2006/main">
+  <p:cSld>
+    <p:spTree>
+      <p:nvGrpSpPr>
+        <p:cNvPr id="1" name=""/>
+        <p:cNvGrpSpPr/>
+        <p:nvPr/>
+      </p:nvGrpSpPr>
+      <p:grpSpPr>
+        <a:xfrm>
+          <a:off x="0" y="0"/>
+          <a:ext cx="0" cy="0"/>
+          <a:chOff x="0" y="0"/>
+          <a:chExt cx="0" cy="0"/>
+        </a:xfrm>
+      </p:grpSpPr>
+      <p:sp>
+        <p:nvSpPr>
+          <p:cNvPr id="2" name="Slide Image Placeholder 1"/>
+          <p:cNvSpPr>
+            <a:spLocks noGrp="1" noRot="1" noChangeAspect="1"/>
+          </p:cNvSpPr>
+          <p:nvPr>
+            <p:ph type="sldImg"/>
+          </p:nvPr>
+        </p:nvSpPr>
+        <p:spPr/>
+      </p:sp>
+      <p:sp>
+        <p:nvSpPr>
+          <p:cNvPr id="3" name="Notes Placeholder 2"/>
+          <p:cNvSpPr>
+            <a:spLocks noGrp="1"/>
+          </p:cNvSpPr>
+          <p:nvPr>
+            <p:ph type="body" idx="1"/>
+          </p:nvPr>
+        </p:nvSpPr>
+        <p:spPr/>
+        <p:txBody>
+          <a:bodyPr/>
+          <a:lstStyle/>
+          <a:p>
+            <a:r>
+              <a:rPr lang="en-US" dirty="0" smtClean="0"/>
               <a:t>Expected</a:t>
             </a:r>
             <a:r>
@@ -652,7 +745,7 @@
           <a:p>
             <a:fld id="{9C14674E-9EC5-4AAF-8942-7F508780F6C1}" type="slidenum">
               <a:rPr lang="en-US" smtClean="0"/>
-              <a:t>16</a:t>
+              <a:t>17</a:t>
             </a:fld>
             <a:endParaRPr lang="en-US"/>
           </a:p>
@@ -991,9 +1084,23 @@
           <a:p>
             <a:r>
               <a:rPr lang="en-US" dirty="0" smtClean="0"/>
-              <a:t>Why did not use generics?</a:t>
-            </a:r>
-            <a:endParaRPr lang="en-US" dirty="0"/>
+              <a:t>Test should be</a:t>
+            </a:r>
+            <a:r>
+              <a:rPr lang="en-US" baseline="0" dirty="0" smtClean="0"/>
+              <a:t> read by three blocks</a:t>
+            </a:r>
+          </a:p>
+          <a:p>
+            <a:r>
+              <a:rPr lang="en-US" baseline="0" dirty="0" smtClean="0"/>
+              <a:t>Given – When </a:t>
+            </a:r>
+            <a:r>
+              <a:rPr lang="en-US" baseline="0" smtClean="0"/>
+              <a:t>- Then</a:t>
+            </a:r>
+            <a:endParaRPr lang="en-US"/>
           </a:p>
         </p:txBody>
       </p:sp>
@@ -1012,9 +1119,9 @@
           <a:bodyPr/>
           <a:lstStyle/>
           <a:p>
-            <a:fld id="{9C14674E-9EC5-4AAF-8942-7F508780F6C1}" type="slidenum">
-              <a:rPr lang="en-US" smtClean="0"/>
-              <a:t>10</a:t>
+            <a:fld id="{8AFB8B3F-7869-436B-B4CC-12D8CE65012B}" type="slidenum">
+              <a:rPr lang="en-US" smtClean="0"/>
+              <a:t>7</a:t>
             </a:fld>
             <a:endParaRPr lang="en-US"/>
           </a:p>
@@ -1023,7 +1130,7 @@
     </p:spTree>
     <p:extLst>
       <p:ext uri="{BB962C8B-B14F-4D97-AF65-F5344CB8AC3E}">
-        <p14:creationId xmlns:p14="http://schemas.microsoft.com/office/powerpoint/2010/main" val="2811015612"/>
+        <p14:creationId xmlns:p14="http://schemas.microsoft.com/office/powerpoint/2010/main" val="1982830058"/>
       </p:ext>
     </p:extLst>
   </p:cSld>
@@ -1079,7 +1186,7 @@
           <a:p>
             <a:r>
               <a:rPr lang="en-US" dirty="0" smtClean="0"/>
-              <a:t>Take care on IDEA warnings</a:t>
+              <a:t>Why did not use generics?</a:t>
             </a:r>
             <a:endParaRPr lang="en-US" dirty="0"/>
           </a:p>
@@ -1111,7 +1218,7 @@
     </p:spTree>
     <p:extLst>
       <p:ext uri="{BB962C8B-B14F-4D97-AF65-F5344CB8AC3E}">
-        <p14:creationId xmlns:p14="http://schemas.microsoft.com/office/powerpoint/2010/main" val="3508479934"/>
+        <p14:creationId xmlns:p14="http://schemas.microsoft.com/office/powerpoint/2010/main" val="2811015612"/>
       </p:ext>
     </p:extLst>
   </p:cSld>
@@ -1167,11 +1274,7 @@
           <a:p>
             <a:r>
               <a:rPr lang="en-US" dirty="0" smtClean="0"/>
-              <a:t>What is</a:t>
-            </a:r>
-            <a:r>
-              <a:rPr lang="en-US" baseline="0" dirty="0" smtClean="0"/>
-              <a:t> wrong with assertions?</a:t>
+              <a:t>Take care on IDEA warnings</a:t>
             </a:r>
             <a:endParaRPr lang="en-US" dirty="0"/>
           </a:p>
@@ -1203,7 +1306,7 @@
     </p:spTree>
     <p:extLst>
       <p:ext uri="{BB962C8B-B14F-4D97-AF65-F5344CB8AC3E}">
-        <p14:creationId xmlns:p14="http://schemas.microsoft.com/office/powerpoint/2010/main" val="475739907"/>
+        <p14:creationId xmlns:p14="http://schemas.microsoft.com/office/powerpoint/2010/main" val="3508479934"/>
       </p:ext>
     </p:extLst>
   </p:cSld>
@@ -1259,19 +1362,11 @@
           <a:p>
             <a:r>
               <a:rPr lang="en-US" dirty="0" smtClean="0"/>
-              <a:t>Be</a:t>
+              <a:t>What is</a:t>
             </a:r>
             <a:r>
               <a:rPr lang="en-US" baseline="0" dirty="0" smtClean="0"/>
-              <a:t> careful, </a:t>
-            </a:r>
-            <a:r>
-              <a:rPr lang="en-US" baseline="0" dirty="0" err="1" smtClean="0"/>
-              <a:t>assertEquals</a:t>
-            </a:r>
-            <a:r>
-              <a:rPr lang="en-US" baseline="0" dirty="0" smtClean="0"/>
-              <a:t> for collections and maps check also collections order, be aware (sometimes we do not need order equality check but only content check)</a:t>
+              <a:t> wrong with assertions?</a:t>
             </a:r>
             <a:endParaRPr lang="en-US" dirty="0"/>
           </a:p>
@@ -1303,7 +1398,7 @@
     </p:spTree>
     <p:extLst>
       <p:ext uri="{BB962C8B-B14F-4D97-AF65-F5344CB8AC3E}">
-        <p14:creationId xmlns:p14="http://schemas.microsoft.com/office/powerpoint/2010/main" val="436454885"/>
+        <p14:creationId xmlns:p14="http://schemas.microsoft.com/office/powerpoint/2010/main" val="475739907"/>
       </p:ext>
     </p:extLst>
   </p:cSld>
@@ -1359,11 +1454,19 @@
           <a:p>
             <a:r>
               <a:rPr lang="en-US" dirty="0" smtClean="0"/>
-              <a:t>Do not</a:t>
+              <a:t>Be</a:t>
             </a:r>
             <a:r>
               <a:rPr lang="en-US" baseline="0" dirty="0" smtClean="0"/>
-              <a:t> modify home task description</a:t>
+              <a:t> careful, </a:t>
+            </a:r>
+            <a:r>
+              <a:rPr lang="en-US" baseline="0" dirty="0" err="1" smtClean="0"/>
+              <a:t>assertEquals</a:t>
+            </a:r>
+            <a:r>
+              <a:rPr lang="en-US" baseline="0" dirty="0" smtClean="0"/>
+              <a:t> for collections and maps check also collections order, be aware (sometimes we do not need order equality check but only content check)</a:t>
             </a:r>
             <a:endParaRPr lang="en-US" dirty="0"/>
           </a:p>
@@ -1386,7 +1489,7 @@
           <a:p>
             <a:fld id="{9C14674E-9EC5-4AAF-8942-7F508780F6C1}" type="slidenum">
               <a:rPr lang="en-US" smtClean="0"/>
-              <a:t>15</a:t>
+              <a:t>14</a:t>
             </a:fld>
             <a:endParaRPr lang="en-US"/>
           </a:p>
@@ -1395,7 +1498,7 @@
     </p:spTree>
     <p:extLst>
       <p:ext uri="{BB962C8B-B14F-4D97-AF65-F5344CB8AC3E}">
-        <p14:creationId xmlns:p14="http://schemas.microsoft.com/office/powerpoint/2010/main" val="3011367316"/>
+        <p14:creationId xmlns:p14="http://schemas.microsoft.com/office/powerpoint/2010/main" val="436454885"/>
       </p:ext>
     </p:extLst>
   </p:cSld>
@@ -1536,7 +1639,7 @@
           <a:p>
             <a:fld id="{071F8888-0BF6-49C3-98D9-F1DFED3C7E72}" type="datetimeFigureOut">
               <a:rPr lang="en-US" smtClean="0"/>
-              <a:t>08-Dec-18</a:t>
+              <a:t>12/9/2018</a:t>
             </a:fld>
             <a:endParaRPr lang="en-US"/>
           </a:p>
@@ -1706,7 +1809,7 @@
           <a:p>
             <a:fld id="{071F8888-0BF6-49C3-98D9-F1DFED3C7E72}" type="datetimeFigureOut">
               <a:rPr lang="en-US" smtClean="0"/>
-              <a:t>08-Dec-18</a:t>
+              <a:t>12/9/2018</a:t>
             </a:fld>
             <a:endParaRPr lang="en-US"/>
           </a:p>
@@ -1886,7 +1989,7 @@
           <a:p>
             <a:fld id="{071F8888-0BF6-49C3-98D9-F1DFED3C7E72}" type="datetimeFigureOut">
               <a:rPr lang="en-US" smtClean="0"/>
-              <a:t>08-Dec-18</a:t>
+              <a:t>12/9/2018</a:t>
             </a:fld>
             <a:endParaRPr lang="en-US"/>
           </a:p>
@@ -2056,7 +2159,7 @@
           <a:p>
             <a:fld id="{071F8888-0BF6-49C3-98D9-F1DFED3C7E72}" type="datetimeFigureOut">
               <a:rPr lang="en-US" smtClean="0"/>
-              <a:t>08-Dec-18</a:t>
+              <a:t>12/9/2018</a:t>
             </a:fld>
             <a:endParaRPr lang="en-US"/>
           </a:p>
@@ -2302,7 +2405,7 @@
           <a:p>
             <a:fld id="{071F8888-0BF6-49C3-98D9-F1DFED3C7E72}" type="datetimeFigureOut">
               <a:rPr lang="en-US" smtClean="0"/>
-              <a:t>08-Dec-18</a:t>
+              <a:t>12/9/2018</a:t>
             </a:fld>
             <a:endParaRPr lang="en-US"/>
           </a:p>
@@ -2534,7 +2637,7 @@
           <a:p>
             <a:fld id="{071F8888-0BF6-49C3-98D9-F1DFED3C7E72}" type="datetimeFigureOut">
               <a:rPr lang="en-US" smtClean="0"/>
-              <a:t>08-Dec-18</a:t>
+              <a:t>12/9/2018</a:t>
             </a:fld>
             <a:endParaRPr lang="en-US"/>
           </a:p>
@@ -2901,7 +3004,7 @@
           <a:p>
             <a:fld id="{071F8888-0BF6-49C3-98D9-F1DFED3C7E72}" type="datetimeFigureOut">
               <a:rPr lang="en-US" smtClean="0"/>
-              <a:t>08-Dec-18</a:t>
+              <a:t>12/9/2018</a:t>
             </a:fld>
             <a:endParaRPr lang="en-US"/>
           </a:p>
@@ -3019,7 +3122,7 @@
           <a:p>
             <a:fld id="{071F8888-0BF6-49C3-98D9-F1DFED3C7E72}" type="datetimeFigureOut">
               <a:rPr lang="en-US" smtClean="0"/>
-              <a:t>08-Dec-18</a:t>
+              <a:t>12/9/2018</a:t>
             </a:fld>
             <a:endParaRPr lang="en-US"/>
           </a:p>
@@ -3114,7 +3217,7 @@
           <a:p>
             <a:fld id="{071F8888-0BF6-49C3-98D9-F1DFED3C7E72}" type="datetimeFigureOut">
               <a:rPr lang="en-US" smtClean="0"/>
-              <a:t>08-Dec-18</a:t>
+              <a:t>12/9/2018</a:t>
             </a:fld>
             <a:endParaRPr lang="en-US"/>
           </a:p>
@@ -3391,7 +3494,7 @@
           <a:p>
             <a:fld id="{071F8888-0BF6-49C3-98D9-F1DFED3C7E72}" type="datetimeFigureOut">
               <a:rPr lang="en-US" smtClean="0"/>
-              <a:t>08-Dec-18</a:t>
+              <a:t>12/9/2018</a:t>
             </a:fld>
             <a:endParaRPr lang="en-US"/>
           </a:p>
@@ -3644,7 +3747,7 @@
           <a:p>
             <a:fld id="{071F8888-0BF6-49C3-98D9-F1DFED3C7E72}" type="datetimeFigureOut">
               <a:rPr lang="en-US" smtClean="0"/>
-              <a:t>08-Dec-18</a:t>
+              <a:t>12/9/2018</a:t>
             </a:fld>
             <a:endParaRPr lang="en-US"/>
           </a:p>
@@ -3857,7 +3960,7 @@
           <a:p>
             <a:fld id="{071F8888-0BF6-49C3-98D9-F1DFED3C7E72}" type="datetimeFigureOut">
               <a:rPr lang="en-US" smtClean="0"/>
-              <a:t>08-Dec-18</a:t>
+              <a:t>12/9/2018</a:t>
             </a:fld>
             <a:endParaRPr lang="en-US"/>
           </a:p>
@@ -4323,7 +4426,7 @@
           <p:cNvPr id="4" name="Місце для номера слайда 3">
             <a:extLst>
               <a:ext uri="{FF2B5EF4-FFF2-40B4-BE49-F238E27FC236}">
-                <a16:creationId xmlns:a16="http://schemas.microsoft.com/office/drawing/2014/main" xmlns="" id="{66E13E1E-21A2-4A4D-9E18-14B481079131}"/>
+                <a16:creationId xmlns:a16="http://schemas.microsoft.com/office/drawing/2014/main" id="{66E13E1E-21A2-4A4D-9E18-14B481079131}"/>
               </a:ext>
             </a:extLst>
           </p:cNvPr>
@@ -4394,6 +4497,85 @@
           <a:p>
             <a:r>
               <a:rPr lang="en-US" dirty="0" smtClean="0"/>
+              <a:t>8. Confusing naming</a:t>
+            </a:r>
+            <a:endParaRPr lang="en-US" dirty="0"/>
+          </a:p>
+        </p:txBody>
+      </p:sp>
+      <p:pic>
+        <p:nvPicPr>
+          <p:cNvPr id="4" name="Content Placeholder 3"/>
+          <p:cNvPicPr>
+            <a:picLocks noGrp="1" noChangeAspect="1"/>
+          </p:cNvPicPr>
+          <p:nvPr>
+            <p:ph idx="1"/>
+          </p:nvPr>
+        </p:nvPicPr>
+        <p:blipFill>
+          <a:blip r:embed="rId2"/>
+          <a:stretch>
+            <a:fillRect/>
+          </a:stretch>
+        </p:blipFill>
+        <p:spPr>
+          <a:xfrm>
+            <a:off x="971937" y="2469822"/>
+            <a:ext cx="10248125" cy="2925647"/>
+          </a:xfrm>
+          <a:prstGeom prst="rect">
+            <a:avLst/>
+          </a:prstGeom>
+        </p:spPr>
+      </p:pic>
+    </p:spTree>
+    <p:extLst>
+      <p:ext uri="{BB962C8B-B14F-4D97-AF65-F5344CB8AC3E}">
+        <p14:creationId xmlns:p14="http://schemas.microsoft.com/office/powerpoint/2010/main" val="3307188235"/>
+      </p:ext>
+    </p:extLst>
+  </p:cSld>
+  <p:clrMapOvr>
+    <a:masterClrMapping/>
+  </p:clrMapOvr>
+</p:sld>
+</file>
+
+<file path=ppt/slides/slide11.xml><?xml version="1.0" encoding="utf-8"?>
+<p:sld xmlns:a="http://schemas.openxmlformats.org/drawingml/2006/main" xmlns:r="http://schemas.openxmlformats.org/officeDocument/2006/relationships" xmlns:p="http://schemas.openxmlformats.org/presentationml/2006/main">
+  <p:cSld>
+    <p:spTree>
+      <p:nvGrpSpPr>
+        <p:cNvPr id="1" name=""/>
+        <p:cNvGrpSpPr/>
+        <p:nvPr/>
+      </p:nvGrpSpPr>
+      <p:grpSpPr>
+        <a:xfrm>
+          <a:off x="0" y="0"/>
+          <a:ext cx="0" cy="0"/>
+          <a:chOff x="0" y="0"/>
+          <a:chExt cx="0" cy="0"/>
+        </a:xfrm>
+      </p:grpSpPr>
+      <p:sp>
+        <p:nvSpPr>
+          <p:cNvPr id="2" name="Title 1"/>
+          <p:cNvSpPr>
+            <a:spLocks noGrp="1"/>
+          </p:cNvSpPr>
+          <p:nvPr>
+            <p:ph type="title"/>
+          </p:nvPr>
+        </p:nvSpPr>
+        <p:spPr/>
+        <p:txBody>
+          <a:bodyPr/>
+          <a:lstStyle/>
+          <a:p>
+            <a:r>
+              <a:rPr lang="en-US" dirty="0" smtClean="0"/>
               <a:t>9. Use generics</a:t>
             </a:r>
             <a:endParaRPr lang="en-US" dirty="0"/>
@@ -4439,7 +4621,7 @@
 </p:sld>
 </file>
 
-<file path=ppt/slides/slide11.xml><?xml version="1.0" encoding="utf-8"?>
+<file path=ppt/slides/slide12.xml><?xml version="1.0" encoding="utf-8"?>
 <p:sld xmlns:a="http://schemas.openxmlformats.org/drawingml/2006/main" xmlns:r="http://schemas.openxmlformats.org/officeDocument/2006/relationships" xmlns:p="http://schemas.openxmlformats.org/presentationml/2006/main">
   <p:cSld>
     <p:spTree>
@@ -4552,7 +4734,7 @@
 </p:sld>
 </file>
 
-<file path=ppt/slides/slide12.xml><?xml version="1.0" encoding="utf-8"?>
+<file path=ppt/slides/slide13.xml><?xml version="1.0" encoding="utf-8"?>
 <p:sld xmlns:a="http://schemas.openxmlformats.org/drawingml/2006/main" xmlns:r="http://schemas.openxmlformats.org/officeDocument/2006/relationships" xmlns:p="http://schemas.openxmlformats.org/presentationml/2006/main">
   <p:cSld>
     <p:spTree>
@@ -4631,7 +4813,7 @@
 </p:sld>
 </file>
 
-<file path=ppt/slides/slide13.xml><?xml version="1.0" encoding="utf-8"?>
+<file path=ppt/slides/slide14.xml><?xml version="1.0" encoding="utf-8"?>
 <p:sld xmlns:a="http://schemas.openxmlformats.org/drawingml/2006/main" xmlns:r="http://schemas.openxmlformats.org/officeDocument/2006/relationships" xmlns:p="http://schemas.openxmlformats.org/presentationml/2006/main">
   <p:cSld>
     <p:spTree>
@@ -4708,7 +4890,7 @@
 </p:sld>
 </file>
 
-<file path=ppt/slides/slide14.xml><?xml version="1.0" encoding="utf-8"?>
+<file path=ppt/slides/slide15.xml><?xml version="1.0" encoding="utf-8"?>
 <p:sld xmlns:a="http://schemas.openxmlformats.org/drawingml/2006/main" xmlns:r="http://schemas.openxmlformats.org/officeDocument/2006/relationships" xmlns:p="http://schemas.openxmlformats.org/presentationml/2006/main">
   <p:cSld>
     <p:spTree>
@@ -4793,7 +4975,7 @@
 </p:sld>
 </file>
 
-<file path=ppt/slides/slide15.xml><?xml version="1.0" encoding="utf-8"?>
+<file path=ppt/slides/slide16.xml><?xml version="1.0" encoding="utf-8"?>
 <p:sld xmlns:a="http://schemas.openxmlformats.org/drawingml/2006/main" xmlns:r="http://schemas.openxmlformats.org/officeDocument/2006/relationships" xmlns:p="http://schemas.openxmlformats.org/presentationml/2006/main">
   <p:cSld>
     <p:spTree>
@@ -4872,7 +5054,7 @@
 </p:sld>
 </file>
 
-<file path=ppt/slides/slide16.xml><?xml version="1.0" encoding="utf-8"?>
+<file path=ppt/slides/slide17.xml><?xml version="1.0" encoding="utf-8"?>
 <p:sld xmlns:a="http://schemas.openxmlformats.org/drawingml/2006/main" xmlns:r="http://schemas.openxmlformats.org/officeDocument/2006/relationships" xmlns:p="http://schemas.openxmlformats.org/presentationml/2006/main">
   <p:cSld>
     <p:spTree>
@@ -4949,7 +5131,7 @@
 </p:sld>
 </file>
 
-<file path=ppt/slides/slide17.xml><?xml version="1.0" encoding="utf-8"?>
+<file path=ppt/slides/slide18.xml><?xml version="1.0" encoding="utf-8"?>
 <p:sld xmlns:a="http://schemas.openxmlformats.org/drawingml/2006/main" xmlns:r="http://schemas.openxmlformats.org/officeDocument/2006/relationships" xmlns:p="http://schemas.openxmlformats.org/presentationml/2006/main">
   <p:cSld>
     <p:spTree>
@@ -5028,7 +5210,7 @@
 </p:sld>
 </file>
 
-<file path=ppt/slides/slide18.xml><?xml version="1.0" encoding="utf-8"?>
+<file path=ppt/slides/slide19.xml><?xml version="1.0" encoding="utf-8"?>
 <p:sld xmlns:a="http://schemas.openxmlformats.org/drawingml/2006/main" xmlns:r="http://schemas.openxmlformats.org/officeDocument/2006/relationships" xmlns:p="http://schemas.openxmlformats.org/presentationml/2006/main">
   <p:cSld>
     <p:spTree>
@@ -5145,15 +5327,7 @@
             </a:r>
             <a:r>
               <a:rPr lang="en-US" dirty="0" smtClean="0"/>
-              <a:t>. Why </a:t>
-            </a:r>
-            <a:r>
-              <a:rPr lang="en-US" dirty="0" smtClean="0"/>
-              <a:t>zero </a:t>
-            </a:r>
-            <a:r>
-              <a:rPr lang="en-US" dirty="0" smtClean="0"/>
-              <a:t>is illegal argument value?</a:t>
+              <a:t>. Why zero is illegal argument value?</a:t>
             </a:r>
             <a:endParaRPr lang="en-US" b="1" dirty="0"/>
           </a:p>
@@ -5636,6 +5810,83 @@
           <a:p>
             <a:r>
               <a:rPr lang="en-US" dirty="0" smtClean="0"/>
+              <a:t>5. Format code</a:t>
+            </a:r>
+            <a:endParaRPr lang="en-US" dirty="0"/>
+          </a:p>
+        </p:txBody>
+      </p:sp>
+      <p:pic>
+        <p:nvPicPr>
+          <p:cNvPr id="7" name="Picture 6"/>
+          <p:cNvPicPr>
+            <a:picLocks noChangeAspect="1"/>
+          </p:cNvPicPr>
+          <p:nvPr/>
+        </p:nvPicPr>
+        <p:blipFill>
+          <a:blip r:embed="rId3"/>
+          <a:stretch>
+            <a:fillRect/>
+          </a:stretch>
+        </p:blipFill>
+        <p:spPr>
+          <a:xfrm>
+            <a:off x="838200" y="1690688"/>
+            <a:ext cx="10344538" cy="3324540"/>
+          </a:xfrm>
+          <a:prstGeom prst="rect">
+            <a:avLst/>
+          </a:prstGeom>
+        </p:spPr>
+      </p:pic>
+    </p:spTree>
+    <p:extLst>
+      <p:ext uri="{BB962C8B-B14F-4D97-AF65-F5344CB8AC3E}">
+        <p14:creationId xmlns:p14="http://schemas.microsoft.com/office/powerpoint/2010/main" val="3159803936"/>
+      </p:ext>
+    </p:extLst>
+  </p:cSld>
+  <p:clrMapOvr>
+    <a:masterClrMapping/>
+  </p:clrMapOvr>
+</p:sld>
+</file>
+
+<file path=ppt/slides/slide8.xml><?xml version="1.0" encoding="utf-8"?>
+<p:sld xmlns:a="http://schemas.openxmlformats.org/drawingml/2006/main" xmlns:r="http://schemas.openxmlformats.org/officeDocument/2006/relationships" xmlns:p="http://schemas.openxmlformats.org/presentationml/2006/main">
+  <p:cSld>
+    <p:spTree>
+      <p:nvGrpSpPr>
+        <p:cNvPr id="1" name=""/>
+        <p:cNvGrpSpPr/>
+        <p:nvPr/>
+      </p:nvGrpSpPr>
+      <p:grpSpPr>
+        <a:xfrm>
+          <a:off x="0" y="0"/>
+          <a:ext cx="0" cy="0"/>
+          <a:chOff x="0" y="0"/>
+          <a:chExt cx="0" cy="0"/>
+        </a:xfrm>
+      </p:grpSpPr>
+      <p:sp>
+        <p:nvSpPr>
+          <p:cNvPr id="2" name="Title 1"/>
+          <p:cNvSpPr>
+            <a:spLocks noGrp="1"/>
+          </p:cNvSpPr>
+          <p:nvPr>
+            <p:ph type="title"/>
+          </p:nvPr>
+        </p:nvSpPr>
+        <p:spPr/>
+        <p:txBody>
+          <a:bodyPr/>
+          <a:lstStyle/>
+          <a:p>
+            <a:r>
+              <a:rPr lang="en-US" dirty="0" smtClean="0"/>
               <a:t>6. Avoid inner classes</a:t>
             </a:r>
             <a:endParaRPr lang="en-US" dirty="0"/>
@@ -5681,7 +5932,7 @@
 </p:sld>
 </file>
 
-<file path=ppt/slides/slide8.xml><?xml version="1.0" encoding="utf-8"?>
+<file path=ppt/slides/slide9.xml><?xml version="1.0" encoding="utf-8"?>
 <p:sld xmlns:a="http://schemas.openxmlformats.org/drawingml/2006/main" xmlns:r="http://schemas.openxmlformats.org/officeDocument/2006/relationships" xmlns:p="http://schemas.openxmlformats.org/presentationml/2006/main">
   <p:cSld>
     <p:spTree>
@@ -5759,85 +6010,6 @@
     <p:extLst>
       <p:ext uri="{BB962C8B-B14F-4D97-AF65-F5344CB8AC3E}">
         <p14:creationId xmlns:p14="http://schemas.microsoft.com/office/powerpoint/2010/main" val="56193345"/>
-      </p:ext>
-    </p:extLst>
-  </p:cSld>
-  <p:clrMapOvr>
-    <a:masterClrMapping/>
-  </p:clrMapOvr>
-</p:sld>
-</file>
-
-<file path=ppt/slides/slide9.xml><?xml version="1.0" encoding="utf-8"?>
-<p:sld xmlns:a="http://schemas.openxmlformats.org/drawingml/2006/main" xmlns:r="http://schemas.openxmlformats.org/officeDocument/2006/relationships" xmlns:p="http://schemas.openxmlformats.org/presentationml/2006/main">
-  <p:cSld>
-    <p:spTree>
-      <p:nvGrpSpPr>
-        <p:cNvPr id="1" name=""/>
-        <p:cNvGrpSpPr/>
-        <p:nvPr/>
-      </p:nvGrpSpPr>
-      <p:grpSpPr>
-        <a:xfrm>
-          <a:off x="0" y="0"/>
-          <a:ext cx="0" cy="0"/>
-          <a:chOff x="0" y="0"/>
-          <a:chExt cx="0" cy="0"/>
-        </a:xfrm>
-      </p:grpSpPr>
-      <p:sp>
-        <p:nvSpPr>
-          <p:cNvPr id="2" name="Title 1"/>
-          <p:cNvSpPr>
-            <a:spLocks noGrp="1"/>
-          </p:cNvSpPr>
-          <p:nvPr>
-            <p:ph type="title"/>
-          </p:nvPr>
-        </p:nvSpPr>
-        <p:spPr/>
-        <p:txBody>
-          <a:bodyPr/>
-          <a:lstStyle/>
-          <a:p>
-            <a:r>
-              <a:rPr lang="en-US" dirty="0" smtClean="0"/>
-              <a:t>8. Confusing naming</a:t>
-            </a:r>
-            <a:endParaRPr lang="en-US" dirty="0"/>
-          </a:p>
-        </p:txBody>
-      </p:sp>
-      <p:pic>
-        <p:nvPicPr>
-          <p:cNvPr id="4" name="Content Placeholder 3"/>
-          <p:cNvPicPr>
-            <a:picLocks noGrp="1" noChangeAspect="1"/>
-          </p:cNvPicPr>
-          <p:nvPr>
-            <p:ph idx="1"/>
-          </p:nvPr>
-        </p:nvPicPr>
-        <p:blipFill>
-          <a:blip r:embed="rId2"/>
-          <a:stretch>
-            <a:fillRect/>
-          </a:stretch>
-        </p:blipFill>
-        <p:spPr>
-          <a:xfrm>
-            <a:off x="971937" y="2469822"/>
-            <a:ext cx="10248125" cy="2925647"/>
-          </a:xfrm>
-          <a:prstGeom prst="rect">
-            <a:avLst/>
-          </a:prstGeom>
-        </p:spPr>
-      </p:pic>
-    </p:spTree>
-    <p:extLst>
-      <p:ext uri="{BB962C8B-B14F-4D97-AF65-F5344CB8AC3E}">
-        <p14:creationId xmlns:p14="http://schemas.microsoft.com/office/powerpoint/2010/main" val="3307188235"/>
       </p:ext>
     </p:extLst>
   </p:cSld>

</xml_diff>